<commit_message>
Update presentation and report
</commit_message>
<xml_diff>
--- a/Final_Presentation.pptx
+++ b/Final_Presentation.pptx
@@ -242,7 +242,7 @@
           <a:p>
             <a:fld id="{FD1A85B0-C9C6-4BCF-B04E-268142AD739B}" type="datetimeFigureOut">
               <a:rPr lang="en-IL" smtClean="0"/>
-              <a:t>11/14/2020</a:t>
+              <a:t>11/18/2020</a:t>
             </a:fld>
             <a:endParaRPr lang="en-IL"/>
           </a:p>
@@ -827,7 +827,7 @@
           <a:p>
             <a:fld id="{2D4FF28C-C840-4EF7-A91A-224BD7BC23DE}" type="datetimeFigureOut">
               <a:rPr lang="en-IL" smtClean="0"/>
-              <a:t>11/14/2020</a:t>
+              <a:t>11/18/2020</a:t>
             </a:fld>
             <a:endParaRPr lang="en-IL"/>
           </a:p>
@@ -1027,7 +1027,7 @@
           <a:p>
             <a:fld id="{2D4FF28C-C840-4EF7-A91A-224BD7BC23DE}" type="datetimeFigureOut">
               <a:rPr lang="en-IL" smtClean="0"/>
-              <a:t>11/14/2020</a:t>
+              <a:t>11/18/2020</a:t>
             </a:fld>
             <a:endParaRPr lang="en-IL"/>
           </a:p>
@@ -1237,7 +1237,7 @@
           <a:p>
             <a:fld id="{2D4FF28C-C840-4EF7-A91A-224BD7BC23DE}" type="datetimeFigureOut">
               <a:rPr lang="en-IL" smtClean="0"/>
-              <a:t>11/14/2020</a:t>
+              <a:t>11/18/2020</a:t>
             </a:fld>
             <a:endParaRPr lang="en-IL"/>
           </a:p>
@@ -1437,7 +1437,7 @@
           <a:p>
             <a:fld id="{2D4FF28C-C840-4EF7-A91A-224BD7BC23DE}" type="datetimeFigureOut">
               <a:rPr lang="en-IL" smtClean="0"/>
-              <a:t>11/14/2020</a:t>
+              <a:t>11/18/2020</a:t>
             </a:fld>
             <a:endParaRPr lang="en-IL"/>
           </a:p>
@@ -1713,7 +1713,7 @@
           <a:p>
             <a:fld id="{2D4FF28C-C840-4EF7-A91A-224BD7BC23DE}" type="datetimeFigureOut">
               <a:rPr lang="en-IL" smtClean="0"/>
-              <a:t>11/14/2020</a:t>
+              <a:t>11/18/2020</a:t>
             </a:fld>
             <a:endParaRPr lang="en-IL"/>
           </a:p>
@@ -1981,7 +1981,7 @@
           <a:p>
             <a:fld id="{2D4FF28C-C840-4EF7-A91A-224BD7BC23DE}" type="datetimeFigureOut">
               <a:rPr lang="en-IL" smtClean="0"/>
-              <a:t>11/14/2020</a:t>
+              <a:t>11/18/2020</a:t>
             </a:fld>
             <a:endParaRPr lang="en-IL"/>
           </a:p>
@@ -2396,7 +2396,7 @@
           <a:p>
             <a:fld id="{2D4FF28C-C840-4EF7-A91A-224BD7BC23DE}" type="datetimeFigureOut">
               <a:rPr lang="en-IL" smtClean="0"/>
-              <a:t>11/14/2020</a:t>
+              <a:t>11/18/2020</a:t>
             </a:fld>
             <a:endParaRPr lang="en-IL"/>
           </a:p>
@@ -2538,7 +2538,7 @@
           <a:p>
             <a:fld id="{2D4FF28C-C840-4EF7-A91A-224BD7BC23DE}" type="datetimeFigureOut">
               <a:rPr lang="en-IL" smtClean="0"/>
-              <a:t>11/14/2020</a:t>
+              <a:t>11/18/2020</a:t>
             </a:fld>
             <a:endParaRPr lang="en-IL"/>
           </a:p>
@@ -2651,7 +2651,7 @@
           <a:p>
             <a:fld id="{2D4FF28C-C840-4EF7-A91A-224BD7BC23DE}" type="datetimeFigureOut">
               <a:rPr lang="en-IL" smtClean="0"/>
-              <a:t>11/14/2020</a:t>
+              <a:t>11/18/2020</a:t>
             </a:fld>
             <a:endParaRPr lang="en-IL"/>
           </a:p>
@@ -2964,7 +2964,7 @@
           <a:p>
             <a:fld id="{2D4FF28C-C840-4EF7-A91A-224BD7BC23DE}" type="datetimeFigureOut">
               <a:rPr lang="en-IL" smtClean="0"/>
-              <a:t>11/14/2020</a:t>
+              <a:t>11/18/2020</a:t>
             </a:fld>
             <a:endParaRPr lang="en-IL"/>
           </a:p>
@@ -3253,7 +3253,7 @@
           <a:p>
             <a:fld id="{2D4FF28C-C840-4EF7-A91A-224BD7BC23DE}" type="datetimeFigureOut">
               <a:rPr lang="en-IL" smtClean="0"/>
-              <a:t>11/14/2020</a:t>
+              <a:t>11/18/2020</a:t>
             </a:fld>
             <a:endParaRPr lang="en-IL"/>
           </a:p>
@@ -3496,7 +3496,7 @@
           <a:p>
             <a:fld id="{2D4FF28C-C840-4EF7-A91A-224BD7BC23DE}" type="datetimeFigureOut">
               <a:rPr lang="en-IL" smtClean="0"/>
-              <a:t>11/14/2020</a:t>
+              <a:t>11/18/2020</a:t>
             </a:fld>
             <a:endParaRPr lang="en-IL"/>
           </a:p>
@@ -8164,7 +8164,7 @@
         <p:spPr>
           <a:xfrm>
             <a:off x="1245704" y="1981849"/>
-            <a:ext cx="9700590" cy="3816429"/>
+            <a:ext cx="9700590" cy="3200876"/>
           </a:xfrm>
           <a:prstGeom prst="rect">
             <a:avLst/>
@@ -8300,33 +8300,6 @@
               <a:t>We expect to increase in power and decrease in performance.</a:t>
             </a:r>
             <a:endParaRPr lang="en-IL" dirty="0">
-              <a:latin typeface="Arial" panose="020B0604020202020204" pitchFamily="34" charset="0"/>
-              <a:cs typeface="Arial" panose="020B0604020202020204" pitchFamily="34" charset="0"/>
-            </a:endParaRPr>
-          </a:p>
-          <a:p>
-            <a:pPr indent="-285750">
-              <a:spcBef>
-                <a:spcPts val="2400"/>
-              </a:spcBef>
-              <a:buFont typeface="Arial" panose="020B0604020202020204" pitchFamily="34" charset="0"/>
-              <a:buChar char="•"/>
-            </a:pPr>
-            <a:r>
-              <a:rPr lang="en-IL" sz="2000" dirty="0">
-                <a:latin typeface="Arial" panose="020B0604020202020204" pitchFamily="34" charset="0"/>
-                <a:cs typeface="Arial" panose="020B0604020202020204" pitchFamily="34" charset="0"/>
-              </a:rPr>
-              <a:t>Implement and debug AES on FPGA</a:t>
-            </a:r>
-            <a:r>
-              <a:rPr lang="en-US" sz="2000" dirty="0">
-                <a:latin typeface="Arial" panose="020B0604020202020204" pitchFamily="34" charset="0"/>
-                <a:cs typeface="Arial" panose="020B0604020202020204" pitchFamily="34" charset="0"/>
-              </a:rPr>
-              <a:t> (optional)</a:t>
-            </a:r>
-            <a:endParaRPr lang="en-IL" sz="2000" dirty="0">
               <a:latin typeface="Arial" panose="020B0604020202020204" pitchFamily="34" charset="0"/>
               <a:cs typeface="Arial" panose="020B0604020202020204" pitchFamily="34" charset="0"/>
             </a:endParaRPr>

</xml_diff>